<commit_message>
Analysis of 2016 Q1 Lending Club dataset
</commit_message>
<xml_diff>
--- a/Sydeaka_Watson_UTDallasDSC2018_Workflow_Automation.pptx
+++ b/Sydeaka_Watson_UTDallasDSC2018_Workflow_Automation.pptx
@@ -211,7 +211,7 @@
           <a:p>
             <a:fld id="{1056DE2E-A099-9E4F-B388-D0B65C2E8A5F}" type="datetimeFigureOut">
               <a:rPr lang="en-US" smtClean="0"/>
-              <a:t>10/5/18</a:t>
+              <a:t>10/6/18</a:t>
             </a:fld>
             <a:endParaRPr lang="en-US"/>
           </a:p>
@@ -709,7 +709,7 @@
           <a:p>
             <a:fld id="{63DAF4BF-BE94-F849-B8EC-0690800DE24D}" type="datetimeFigureOut">
               <a:rPr lang="en-US" smtClean="0"/>
-              <a:t>10/5/18</a:t>
+              <a:t>10/6/18</a:t>
             </a:fld>
             <a:endParaRPr lang="en-US"/>
           </a:p>
@@ -907,7 +907,7 @@
           <a:p>
             <a:fld id="{63DAF4BF-BE94-F849-B8EC-0690800DE24D}" type="datetimeFigureOut">
               <a:rPr lang="en-US" smtClean="0"/>
-              <a:t>10/5/18</a:t>
+              <a:t>10/6/18</a:t>
             </a:fld>
             <a:endParaRPr lang="en-US"/>
           </a:p>
@@ -1115,7 +1115,7 @@
           <a:p>
             <a:fld id="{63DAF4BF-BE94-F849-B8EC-0690800DE24D}" type="datetimeFigureOut">
               <a:rPr lang="en-US" smtClean="0"/>
-              <a:t>10/5/18</a:t>
+              <a:t>10/6/18</a:t>
             </a:fld>
             <a:endParaRPr lang="en-US"/>
           </a:p>
@@ -1313,7 +1313,7 @@
           <a:p>
             <a:fld id="{63DAF4BF-BE94-F849-B8EC-0690800DE24D}" type="datetimeFigureOut">
               <a:rPr lang="en-US" smtClean="0"/>
-              <a:t>10/5/18</a:t>
+              <a:t>10/6/18</a:t>
             </a:fld>
             <a:endParaRPr lang="en-US"/>
           </a:p>
@@ -1588,7 +1588,7 @@
           <a:p>
             <a:fld id="{63DAF4BF-BE94-F849-B8EC-0690800DE24D}" type="datetimeFigureOut">
               <a:rPr lang="en-US" smtClean="0"/>
-              <a:t>10/5/18</a:t>
+              <a:t>10/6/18</a:t>
             </a:fld>
             <a:endParaRPr lang="en-US"/>
           </a:p>
@@ -1853,7 +1853,7 @@
           <a:p>
             <a:fld id="{63DAF4BF-BE94-F849-B8EC-0690800DE24D}" type="datetimeFigureOut">
               <a:rPr lang="en-US" smtClean="0"/>
-              <a:t>10/5/18</a:t>
+              <a:t>10/6/18</a:t>
             </a:fld>
             <a:endParaRPr lang="en-US"/>
           </a:p>
@@ -2265,7 +2265,7 @@
           <a:p>
             <a:fld id="{63DAF4BF-BE94-F849-B8EC-0690800DE24D}" type="datetimeFigureOut">
               <a:rPr lang="en-US" smtClean="0"/>
-              <a:t>10/5/18</a:t>
+              <a:t>10/6/18</a:t>
             </a:fld>
             <a:endParaRPr lang="en-US"/>
           </a:p>
@@ -2406,7 +2406,7 @@
           <a:p>
             <a:fld id="{63DAF4BF-BE94-F849-B8EC-0690800DE24D}" type="datetimeFigureOut">
               <a:rPr lang="en-US" smtClean="0"/>
-              <a:t>10/5/18</a:t>
+              <a:t>10/6/18</a:t>
             </a:fld>
             <a:endParaRPr lang="en-US"/>
           </a:p>
@@ -2519,7 +2519,7 @@
           <a:p>
             <a:fld id="{63DAF4BF-BE94-F849-B8EC-0690800DE24D}" type="datetimeFigureOut">
               <a:rPr lang="en-US" smtClean="0"/>
-              <a:t>10/5/18</a:t>
+              <a:t>10/6/18</a:t>
             </a:fld>
             <a:endParaRPr lang="en-US"/>
           </a:p>
@@ -2830,7 +2830,7 @@
           <a:p>
             <a:fld id="{63DAF4BF-BE94-F849-B8EC-0690800DE24D}" type="datetimeFigureOut">
               <a:rPr lang="en-US" smtClean="0"/>
-              <a:t>10/5/18</a:t>
+              <a:t>10/6/18</a:t>
             </a:fld>
             <a:endParaRPr lang="en-US"/>
           </a:p>
@@ -3118,7 +3118,7 @@
           <a:p>
             <a:fld id="{63DAF4BF-BE94-F849-B8EC-0690800DE24D}" type="datetimeFigureOut">
               <a:rPr lang="en-US" smtClean="0"/>
-              <a:t>10/5/18</a:t>
+              <a:t>10/6/18</a:t>
             </a:fld>
             <a:endParaRPr lang="en-US"/>
           </a:p>
@@ -3359,7 +3359,7 @@
           <a:p>
             <a:fld id="{63DAF4BF-BE94-F849-B8EC-0690800DE24D}" type="datetimeFigureOut">
               <a:rPr lang="en-US" smtClean="0"/>
-              <a:t>10/5/18</a:t>
+              <a:t>10/6/18</a:t>
             </a:fld>
             <a:endParaRPr lang="en-US"/>
           </a:p>
@@ -3762,6 +3762,14 @@
 <file path=ppt/slides/slide1.xml><?xml version="1.0" encoding="utf-8"?>
 <p:sld xmlns:a="http://schemas.openxmlformats.org/drawingml/2006/main" xmlns:r="http://schemas.openxmlformats.org/officeDocument/2006/relationships" xmlns:p="http://schemas.openxmlformats.org/presentationml/2006/main">
   <p:cSld>
+    <p:bg>
+      <p:bgPr>
+        <a:solidFill>
+          <a:schemeClr val="bg1"/>
+        </a:solidFill>
+        <a:effectLst/>
+      </p:bgPr>
+    </p:bg>
     <p:spTree>
       <p:nvGrpSpPr>
         <p:cNvPr id="1" name=""/>
@@ -3778,107 +3786,525 @@
       </p:grpSpPr>
       <p:sp>
         <p:nvSpPr>
-          <p:cNvPr id="2" name="Title 1">
-            <a:extLst>
-              <a:ext uri="{FF2B5EF4-FFF2-40B4-BE49-F238E27FC236}">
-                <a16:creationId xmlns:a16="http://schemas.microsoft.com/office/drawing/2014/main" id="{6E51ED9D-7D86-664B-98CD-DFDBC7F56DD7}"/>
-              </a:ext>
-            </a:extLst>
-          </p:cNvPr>
-          <p:cNvSpPr>
-            <a:spLocks noGrp="1"/>
-          </p:cNvSpPr>
-          <p:nvPr>
-            <p:ph type="ctrTitle"/>
+          <p:cNvPr id="10" name="Rectangle 9">
+            <a:extLst>
+              <a:ext uri="{FF2B5EF4-FFF2-40B4-BE49-F238E27FC236}">
+                <a16:creationId xmlns:a16="http://schemas.microsoft.com/office/drawing/2014/main" id="{AFA67CD3-AB4E-4A7A-BEB8-53C445D8C44E}"/>
+              </a:ext>
+              <a:ext uri="{C183D7F6-B498-43B3-948B-1728B52AA6E4}">
+                <adec:decorative xmlns:adec="http://schemas.microsoft.com/office/drawing/2017/decorative" val="1"/>
+              </a:ext>
+            </a:extLst>
+          </p:cNvPr>
+          <p:cNvSpPr>
+            <a:spLocks noGrp="1" noRot="1" noChangeAspect="1" noMove="1" noResize="1" noEditPoints="1" noAdjustHandles="1" noChangeArrowheads="1" noChangeShapeType="1" noTextEdit="1"/>
+          </p:cNvSpPr>
+          <p:nvPr>
+            <p:extLst>
+              <p:ext uri="{386F3935-93C4-4BCD-93E2-E3B085C9AB24}">
+                <p16:designElem xmlns:p16="http://schemas.microsoft.com/office/powerpoint/2015/main" val="1"/>
+              </p:ext>
+            </p:extLst>
           </p:nvPr>
         </p:nvSpPr>
         <p:spPr>
           <a:xfrm>
-            <a:off x="1524000" y="1333946"/>
-            <a:ext cx="9144000" cy="1336918"/>
+            <a:off x="1" y="3726"/>
+            <a:ext cx="5614875" cy="6858000"/>
+          </a:xfrm>
+          <a:prstGeom prst="rect">
+            <a:avLst/>
+          </a:prstGeom>
+          <a:gradFill>
+            <a:gsLst>
+              <a:gs pos="0">
+                <a:schemeClr val="accent1">
+                  <a:lumMod val="100000"/>
+                  <a:alpha val="82000"/>
+                </a:schemeClr>
+              </a:gs>
+              <a:gs pos="25000">
+                <a:schemeClr val="accent1">
+                  <a:alpha val="60000"/>
+                </a:schemeClr>
+              </a:gs>
+              <a:gs pos="94000">
+                <a:schemeClr val="bg2">
+                  <a:lumMod val="75000"/>
+                </a:schemeClr>
+              </a:gs>
+              <a:gs pos="100000">
+                <a:schemeClr val="bg2">
+                  <a:lumMod val="75000"/>
+                </a:schemeClr>
+              </a:gs>
+            </a:gsLst>
+            <a:lin ang="4200000" scaled="0"/>
+          </a:gradFill>
+          <a:ln>
+            <a:noFill/>
+          </a:ln>
+        </p:spPr>
+        <p:style>
+          <a:lnRef idx="2">
+            <a:schemeClr val="accent1">
+              <a:shade val="50000"/>
+            </a:schemeClr>
+          </a:lnRef>
+          <a:fillRef idx="1">
+            <a:schemeClr val="accent1"/>
+          </a:fillRef>
+          <a:effectRef idx="0">
+            <a:schemeClr val="accent1"/>
+          </a:effectRef>
+          <a:fontRef idx="minor">
+            <a:schemeClr val="lt1"/>
+          </a:fontRef>
+        </p:style>
+        <p:txBody>
+          <a:bodyPr rtlCol="0" anchor="ctr"/>
+          <a:lstStyle/>
+          <a:p>
+            <a:pPr algn="ctr"/>
+            <a:endParaRPr lang="en-US"/>
+          </a:p>
+        </p:txBody>
+      </p:sp>
+      <p:pic>
+        <p:nvPicPr>
+          <p:cNvPr id="12" name="Picture 11">
+            <a:extLst>
+              <a:ext uri="{FF2B5EF4-FFF2-40B4-BE49-F238E27FC236}">
+                <a16:creationId xmlns:a16="http://schemas.microsoft.com/office/drawing/2014/main" id="{07CF545F-9C2E-4446-97CD-AD92990C2B68}"/>
+              </a:ext>
+              <a:ext uri="{C183D7F6-B498-43B3-948B-1728B52AA6E4}">
+                <adec:decorative xmlns:adec="http://schemas.microsoft.com/office/drawing/2017/decorative" val="1"/>
+              </a:ext>
+            </a:extLst>
+          </p:cNvPr>
+          <p:cNvPicPr>
+            <a:picLocks noGrp="1" noRot="1" noChangeAspect="1" noMove="1" noResize="1" noEditPoints="1" noAdjustHandles="1" noChangeArrowheads="1" noChangeShapeType="1" noCrop="1"/>
+          </p:cNvPicPr>
+          <p:nvPr>
+            <p:extLst>
+              <p:ext uri="{386F3935-93C4-4BCD-93E2-E3B085C9AB24}">
+                <p16:designElem xmlns:p16="http://schemas.microsoft.com/office/powerpoint/2015/main" val="1"/>
+              </p:ext>
+            </p:extLst>
+          </p:nvPr>
+        </p:nvPicPr>
+        <p:blipFill>
+          <a:blip r:embed="rId2">
+            <a:extLst>
+              <a:ext uri="{28A0092B-C50C-407E-A947-70E740481C1C}">
+                <a14:useLocalDpi xmlns:a14="http://schemas.microsoft.com/office/drawing/2010/main" val="0"/>
+              </a:ext>
+            </a:extLst>
+          </a:blip>
+          <a:stretch>
+            <a:fillRect/>
+          </a:stretch>
+        </p:blipFill>
+        <p:spPr>
+          <a:xfrm>
+            <a:off x="0" y="0"/>
+            <a:ext cx="12192000" cy="6858000"/>
+          </a:xfrm>
+          <a:prstGeom prst="rect">
+            <a:avLst/>
+          </a:prstGeom>
+        </p:spPr>
+      </p:pic>
+      <p:sp>
+        <p:nvSpPr>
+          <p:cNvPr id="2" name="Title 1">
+            <a:extLst>
+              <a:ext uri="{FF2B5EF4-FFF2-40B4-BE49-F238E27FC236}">
+                <a16:creationId xmlns:a16="http://schemas.microsoft.com/office/drawing/2014/main" id="{6E51ED9D-7D86-664B-98CD-DFDBC7F56DD7}"/>
+              </a:ext>
+            </a:extLst>
+          </p:cNvPr>
+          <p:cNvSpPr>
+            <a:spLocks noGrp="1"/>
+          </p:cNvSpPr>
+          <p:nvPr>
+            <p:ph type="ctrTitle"/>
+          </p:nvPr>
+        </p:nvSpPr>
+        <p:spPr>
+          <a:xfrm>
+            <a:off x="6094105" y="802955"/>
+            <a:ext cx="4977976" cy="1454051"/>
           </a:xfrm>
         </p:spPr>
         <p:txBody>
-          <a:bodyPr>
+          <a:bodyPr vert="horz" lIns="91440" tIns="45720" rIns="91440" bIns="45720" rtlCol="0" anchor="ctr">
             <a:normAutofit/>
           </a:bodyPr>
           <a:lstStyle/>
           <a:p>
-            <a:r>
-              <a:rPr lang="en-US" sz="4800"/>
+            <a:pPr algn="l"/>
+            <a:r>
+              <a:rPr lang="en-US" sz="3100" kern="1200">
+                <a:solidFill>
+                  <a:srgbClr val="000000"/>
+                </a:solidFill>
+                <a:latin typeface="+mj-lt"/>
+                <a:ea typeface="+mj-ea"/>
+                <a:cs typeface="+mj-cs"/>
+              </a:rPr>
               <a:t>The Automation Mindset: </a:t>
             </a:r>
             <a:br>
-              <a:rPr lang="en-US" sz="4800"/>
+              <a:rPr lang="en-US" sz="3100" kern="1200">
+                <a:solidFill>
+                  <a:srgbClr val="000000"/>
+                </a:solidFill>
+                <a:latin typeface="+mj-lt"/>
+                <a:ea typeface="+mj-ea"/>
+                <a:cs typeface="+mj-cs"/>
+              </a:rPr>
             </a:br>
             <a:r>
-              <a:rPr lang="en-US" sz="2800"/>
+              <a:rPr lang="en-US" sz="3100" kern="1200">
+                <a:solidFill>
+                  <a:srgbClr val="000000"/>
+                </a:solidFill>
+                <a:latin typeface="+mj-lt"/>
+                <a:ea typeface="+mj-ea"/>
+                <a:cs typeface="+mj-cs"/>
+              </a:rPr>
               <a:t>Tips/Tools for Streamlining Data Science Workflows</a:t>
             </a:r>
-            <a:endParaRPr lang="en-US" sz="2800" dirty="0"/>
-          </a:p>
-        </p:txBody>
-      </p:sp>
-      <p:sp>
-        <p:nvSpPr>
-          <p:cNvPr id="3" name="Subtitle 2">
-            <a:extLst>
-              <a:ext uri="{FF2B5EF4-FFF2-40B4-BE49-F238E27FC236}">
-                <a16:creationId xmlns:a16="http://schemas.microsoft.com/office/drawing/2014/main" id="{AF9E701A-DC3D-CE4C-9815-B89E413985B5}"/>
-              </a:ext>
-            </a:extLst>
-          </p:cNvPr>
-          <p:cNvSpPr>
-            <a:spLocks noGrp="1"/>
-          </p:cNvSpPr>
-          <p:nvPr>
-            <p:ph type="subTitle" idx="1"/>
+          </a:p>
+        </p:txBody>
+      </p:sp>
+      <p:sp>
+        <p:nvSpPr>
+          <p:cNvPr id="17" name="Freeform 62">
+            <a:extLst>
+              <a:ext uri="{FF2B5EF4-FFF2-40B4-BE49-F238E27FC236}">
+                <a16:creationId xmlns:a16="http://schemas.microsoft.com/office/drawing/2014/main" id="{339C8D78-A644-462F-B674-F440635E5353}"/>
+              </a:ext>
+              <a:ext uri="{C183D7F6-B498-43B3-948B-1728B52AA6E4}">
+                <adec:decorative xmlns:adec="http://schemas.microsoft.com/office/drawing/2017/decorative" val="1"/>
+              </a:ext>
+            </a:extLst>
+          </p:cNvPr>
+          <p:cNvSpPr>
+            <a:spLocks noGrp="1" noRot="1" noChangeAspect="1" noMove="1" noResize="1" noEditPoints="1" noAdjustHandles="1" noChangeArrowheads="1" noChangeShapeType="1" noTextEdit="1"/>
+          </p:cNvSpPr>
+          <p:nvPr>
+            <p:extLst>
+              <p:ext uri="{386F3935-93C4-4BCD-93E2-E3B085C9AB24}">
+                <p16:designElem xmlns:p16="http://schemas.microsoft.com/office/powerpoint/2015/main" val="1"/>
+              </p:ext>
+            </p:extLst>
           </p:nvPr>
         </p:nvSpPr>
         <p:spPr>
           <a:xfrm>
-            <a:off x="1524000" y="3509963"/>
-            <a:ext cx="9144000" cy="2436328"/>
+            <a:off x="0" y="738619"/>
+            <a:ext cx="5000438" cy="5400962"/>
+          </a:xfrm>
+          <a:custGeom>
+            <a:avLst/>
+            <a:gdLst>
+              <a:gd name="connsiteX0" fmla="*/ 2299956 w 5000438"/>
+              <a:gd name="connsiteY0" fmla="*/ 0 h 5400962"/>
+              <a:gd name="connsiteX1" fmla="*/ 5000438 w 5000438"/>
+              <a:gd name="connsiteY1" fmla="*/ 2700481 h 5400962"/>
+              <a:gd name="connsiteX2" fmla="*/ 2299956 w 5000438"/>
+              <a:gd name="connsiteY2" fmla="*/ 5400962 h 5400962"/>
+              <a:gd name="connsiteX3" fmla="*/ 60675 w 5000438"/>
+              <a:gd name="connsiteY3" fmla="*/ 4210346 h 5400962"/>
+              <a:gd name="connsiteX4" fmla="*/ 0 w 5000438"/>
+              <a:gd name="connsiteY4" fmla="*/ 4110472 h 5400962"/>
+              <a:gd name="connsiteX5" fmla="*/ 0 w 5000438"/>
+              <a:gd name="connsiteY5" fmla="*/ 1290491 h 5400962"/>
+              <a:gd name="connsiteX6" fmla="*/ 60675 w 5000438"/>
+              <a:gd name="connsiteY6" fmla="*/ 1190617 h 5400962"/>
+              <a:gd name="connsiteX7" fmla="*/ 2299956 w 5000438"/>
+              <a:gd name="connsiteY7" fmla="*/ 0 h 5400962"/>
+            </a:gdLst>
+            <a:ahLst/>
+            <a:cxnLst>
+              <a:cxn ang="0">
+                <a:pos x="connsiteX0" y="connsiteY0"/>
+              </a:cxn>
+              <a:cxn ang="0">
+                <a:pos x="connsiteX1" y="connsiteY1"/>
+              </a:cxn>
+              <a:cxn ang="0">
+                <a:pos x="connsiteX2" y="connsiteY2"/>
+              </a:cxn>
+              <a:cxn ang="0">
+                <a:pos x="connsiteX3" y="connsiteY3"/>
+              </a:cxn>
+              <a:cxn ang="0">
+                <a:pos x="connsiteX4" y="connsiteY4"/>
+              </a:cxn>
+              <a:cxn ang="0">
+                <a:pos x="connsiteX5" y="connsiteY5"/>
+              </a:cxn>
+              <a:cxn ang="0">
+                <a:pos x="connsiteX6" y="connsiteY6"/>
+              </a:cxn>
+              <a:cxn ang="0">
+                <a:pos x="connsiteX7" y="connsiteY7"/>
+              </a:cxn>
+            </a:cxnLst>
+            <a:rect l="l" t="t" r="r" b="b"/>
+            <a:pathLst>
+              <a:path w="5000438" h="5400962">
+                <a:moveTo>
+                  <a:pt x="2299956" y="0"/>
+                </a:moveTo>
+                <a:cubicBezTo>
+                  <a:pt x="3791390" y="0"/>
+                  <a:pt x="5000438" y="1209047"/>
+                  <a:pt x="5000438" y="2700481"/>
+                </a:cubicBezTo>
+                <a:cubicBezTo>
+                  <a:pt x="5000438" y="4191915"/>
+                  <a:pt x="3791390" y="5400962"/>
+                  <a:pt x="2299956" y="5400962"/>
+                </a:cubicBezTo>
+                <a:cubicBezTo>
+                  <a:pt x="1367810" y="5400962"/>
+                  <a:pt x="545971" y="4928678"/>
+                  <a:pt x="60675" y="4210346"/>
+                </a:cubicBezTo>
+                <a:lnTo>
+                  <a:pt x="0" y="4110472"/>
+                </a:lnTo>
+                <a:lnTo>
+                  <a:pt x="0" y="1290491"/>
+                </a:lnTo>
+                <a:lnTo>
+                  <a:pt x="60675" y="1190617"/>
+                </a:lnTo>
+                <a:cubicBezTo>
+                  <a:pt x="545971" y="472284"/>
+                  <a:pt x="1367810" y="0"/>
+                  <a:pt x="2299956" y="0"/>
+                </a:cubicBezTo>
+                <a:close/>
+              </a:path>
+            </a:pathLst>
+          </a:custGeom>
+          <a:solidFill>
+            <a:srgbClr val="FFFFFF"/>
+          </a:solidFill>
+          <a:ln>
+            <a:gradFill>
+              <a:gsLst>
+                <a:gs pos="0">
+                  <a:schemeClr val="accent1">
+                    <a:lumMod val="40000"/>
+                    <a:lumOff val="60000"/>
+                  </a:schemeClr>
+                </a:gs>
+                <a:gs pos="23000">
+                  <a:schemeClr val="accent1">
+                    <a:lumMod val="45000"/>
+                    <a:lumOff val="55000"/>
+                  </a:schemeClr>
+                </a:gs>
+                <a:gs pos="83000">
+                  <a:schemeClr val="bg2">
+                    <a:lumMod val="85000"/>
+                  </a:schemeClr>
+                </a:gs>
+                <a:gs pos="100000">
+                  <a:schemeClr val="bg2">
+                    <a:lumMod val="85000"/>
+                  </a:schemeClr>
+                </a:gs>
+              </a:gsLst>
+              <a:lin ang="5400000" scaled="1"/>
+            </a:gradFill>
+          </a:ln>
+        </p:spPr>
+        <p:style>
+          <a:lnRef idx="2">
+            <a:schemeClr val="accent1">
+              <a:shade val="50000"/>
+            </a:schemeClr>
+          </a:lnRef>
+          <a:fillRef idx="1">
+            <a:schemeClr val="accent1"/>
+          </a:fillRef>
+          <a:effectRef idx="0">
+            <a:schemeClr val="accent1"/>
+          </a:effectRef>
+          <a:fontRef idx="minor">
+            <a:schemeClr val="lt1"/>
+          </a:fontRef>
+        </p:style>
+        <p:txBody>
+          <a:bodyPr wrap="square" rtlCol="0" anchor="ctr">
+            <a:noAutofit/>
+          </a:bodyPr>
+          <a:lstStyle/>
+          <a:p>
+            <a:pPr algn="ctr"/>
+            <a:endParaRPr lang="en-US"/>
+          </a:p>
+        </p:txBody>
+      </p:sp>
+      <p:pic>
+        <p:nvPicPr>
+          <p:cNvPr id="7" name="Graphic 6" descr="Head with Gears">
+            <a:extLst>
+              <a:ext uri="{FF2B5EF4-FFF2-40B4-BE49-F238E27FC236}">
+                <a16:creationId xmlns:a16="http://schemas.microsoft.com/office/drawing/2014/main" id="{C18182CA-8003-41F2-88D7-75DF033A67B2}"/>
+              </a:ext>
+            </a:extLst>
+          </p:cNvPr>
+          <p:cNvPicPr>
+            <a:picLocks noChangeAspect="1"/>
+          </p:cNvPicPr>
+          <p:nvPr/>
+        </p:nvPicPr>
+        <p:blipFill>
+          <a:blip r:embed="rId3">
+            <a:extLst>
+              <a:ext uri="{28A0092B-C50C-407E-A947-70E740481C1C}">
+                <a14:useLocalDpi xmlns:a14="http://schemas.microsoft.com/office/drawing/2010/main" val="0"/>
+              </a:ext>
+              <a:ext uri="{96DAC541-7B7A-43D3-8B79-37D633B846F1}">
+                <asvg:svgBlip xmlns:asvg="http://schemas.microsoft.com/office/drawing/2016/SVG/main" r:embed="rId4"/>
+              </a:ext>
+            </a:extLst>
+          </a:blip>
+          <a:stretch>
+            <a:fillRect/>
+          </a:stretch>
+        </p:blipFill>
+        <p:spPr>
+          <a:xfrm>
+            <a:off x="450254" y="1629089"/>
+            <a:ext cx="3620021" cy="3620021"/>
+          </a:xfrm>
+          <a:prstGeom prst="rect">
+            <a:avLst/>
+          </a:prstGeom>
+        </p:spPr>
+      </p:pic>
+      <p:sp>
+        <p:nvSpPr>
+          <p:cNvPr id="3" name="Subtitle 2">
+            <a:extLst>
+              <a:ext uri="{FF2B5EF4-FFF2-40B4-BE49-F238E27FC236}">
+                <a16:creationId xmlns:a16="http://schemas.microsoft.com/office/drawing/2014/main" id="{AF9E701A-DC3D-CE4C-9815-B89E413985B5}"/>
+              </a:ext>
+            </a:extLst>
+          </p:cNvPr>
+          <p:cNvSpPr>
+            <a:spLocks noGrp="1"/>
+          </p:cNvSpPr>
+          <p:nvPr>
+            <p:ph type="subTitle" idx="1"/>
+          </p:nvPr>
+        </p:nvSpPr>
+        <p:spPr>
+          <a:xfrm>
+            <a:off x="6090574" y="2421682"/>
+            <a:ext cx="4977578" cy="3639289"/>
           </a:xfrm>
         </p:spPr>
         <p:txBody>
-          <a:bodyPr>
-            <a:normAutofit lnSpcReduction="10000"/>
+          <a:bodyPr vert="horz" lIns="91440" tIns="45720" rIns="91440" bIns="45720" rtlCol="0" anchor="ctr">
+            <a:normAutofit/>
           </a:bodyPr>
           <a:lstStyle/>
           <a:p>
-            <a:r>
-              <a:rPr lang="en-US"/>
-              <a:t>Sydeaka Watson, Ph.D.</a:t>
-            </a:r>
-          </a:p>
-          <a:p>
-            <a:r>
-              <a:rPr lang="en-US" sz="2200"/>
+            <a:pPr algn="l"/>
+            <a:r>
+              <a:rPr lang="en-US" sz="2000" dirty="0" err="1">
+                <a:solidFill>
+                  <a:srgbClr val="000000"/>
+                </a:solidFill>
+              </a:rPr>
+              <a:t>Sydeaka</a:t>
+            </a:r>
+            <a:r>
+              <a:rPr lang="en-US" sz="2000" dirty="0">
+                <a:solidFill>
+                  <a:srgbClr val="000000"/>
+                </a:solidFill>
+              </a:rPr>
+              <a:t> Watson, Ph.D.</a:t>
+            </a:r>
+          </a:p>
+          <a:p>
+            <a:pPr algn="l"/>
+            <a:r>
+              <a:rPr lang="en-US" sz="2000" dirty="0">
+                <a:solidFill>
+                  <a:srgbClr val="000000"/>
+                </a:solidFill>
+              </a:rPr>
               <a:t>Senior Data Scientist, AT&amp;T Chief Data Office</a:t>
             </a:r>
           </a:p>
           <a:p>
-            <a:r>
-              <a:rPr lang="en-US" sz="2200"/>
-              <a:t>Owner &amp; Lead Data Scientist, Korelasi Data Insights, L.L.C</a:t>
-            </a:r>
-          </a:p>
-          <a:p>
-            <a:endParaRPr lang="en-US"/>
-          </a:p>
-          <a:p>
-            <a:r>
-              <a:rPr lang="en-US" sz="2200"/>
+            <a:pPr algn="l"/>
+            <a:r>
+              <a:rPr lang="en-US" sz="2000" dirty="0">
+                <a:solidFill>
+                  <a:srgbClr val="000000"/>
+                </a:solidFill>
+              </a:rPr>
+              <a:t>Owner &amp; Lead Data Scientist, </a:t>
+            </a:r>
+            <a:r>
+              <a:rPr lang="en-US" sz="2000" dirty="0" err="1">
+                <a:solidFill>
+                  <a:srgbClr val="000000"/>
+                </a:solidFill>
+              </a:rPr>
+              <a:t>Korelasi</a:t>
+            </a:r>
+            <a:r>
+              <a:rPr lang="en-US" sz="2000" dirty="0">
+                <a:solidFill>
+                  <a:srgbClr val="000000"/>
+                </a:solidFill>
+              </a:rPr>
+              <a:t> Data Insights, L.L.C</a:t>
+            </a:r>
+          </a:p>
+          <a:p>
+            <a:pPr algn="l"/>
+            <a:endParaRPr lang="en-US" sz="2000" dirty="0">
+              <a:solidFill>
+                <a:srgbClr val="000000"/>
+              </a:solidFill>
+            </a:endParaRPr>
+          </a:p>
+          <a:p>
+            <a:pPr algn="l"/>
+            <a:r>
+              <a:rPr lang="en-US" sz="2000" dirty="0">
+                <a:solidFill>
+                  <a:srgbClr val="000000"/>
+                </a:solidFill>
+              </a:rPr>
               <a:t>UT Dallas Data Science Conference</a:t>
             </a:r>
           </a:p>
           <a:p>
-            <a:r>
-              <a:rPr lang="en-US" sz="2200"/>
+            <a:pPr algn="l"/>
+            <a:r>
+              <a:rPr lang="en-US" sz="2000" dirty="0">
+                <a:solidFill>
+                  <a:srgbClr val="000000"/>
+                </a:solidFill>
+              </a:rPr>
               <a:t>October 6, 2018</a:t>
             </a:r>
-            <a:endParaRPr lang="en-US" sz="2200" dirty="0"/>
           </a:p>
         </p:txBody>
       </p:sp>
@@ -5324,7 +5750,7 @@
             <a:pPr algn="ctr"/>
             <a:r>
               <a:rPr lang="en-US" dirty="0"/>
-              <a:t>QUESTIONS?</a:t>
+              <a:t>THANKS!</a:t>
             </a:r>
           </a:p>
         </p:txBody>
@@ -5679,7 +6105,10 @@
           <a:bodyPr/>
           <a:lstStyle/>
           <a:p>
-            <a:endParaRPr lang="en-US" dirty="0"/>
+            <a:r>
+              <a:rPr lang="en-US" dirty="0"/>
+              <a:t>Automated Data Science Workflows</a:t>
+            </a:r>
           </a:p>
         </p:txBody>
       </p:sp>
@@ -6054,7 +6483,12 @@
             <p:ph idx="1"/>
           </p:nvPr>
         </p:nvSpPr>
-        <p:spPr/>
+        <p:spPr>
+          <a:xfrm>
+            <a:off x="838200" y="1825625"/>
+            <a:ext cx="10515600" cy="4671994"/>
+          </a:xfrm>
+        </p:spPr>
         <p:txBody>
           <a:bodyPr/>
           <a:lstStyle/>
@@ -6062,14 +6496,14 @@
             <a:pPr lvl="0"/>
             <a:r>
               <a:rPr lang="en-US" dirty="0"/>
-              <a:t>Modularized approach, with flexibility to swap out components</a:t>
+              <a:t>Adopt modularized approach, with flexibility to swap out components</a:t>
             </a:r>
           </a:p>
           <a:p>
             <a:pPr lvl="0"/>
             <a:r>
               <a:rPr lang="en-US" dirty="0"/>
-              <a:t>Common framework from which all scripts are executed (e.g., Bash)</a:t>
+              <a:t>Use common framework from which all scripts are executed (e.g., Bash)</a:t>
             </a:r>
           </a:p>
           <a:p>
@@ -6090,7 +6524,7 @@
             <a:pPr lvl="0"/>
             <a:r>
               <a:rPr lang="en-US" dirty="0"/>
-              <a:t>Create code</a:t>
+              <a:t>Write code that creates/executes dynamically generated code</a:t>
             </a:r>
           </a:p>
           <a:p>

</xml_diff>